<commit_message>
Created ellipse drawing with standard deviation in 2 dimensions
</commit_message>
<xml_diff>
--- a/Files/Notes/Nature of Code P5_introduction.pptx
+++ b/Files/Notes/Nature of Code P5_introduction.pptx
@@ -327,7 +327,7 @@
           <a:p>
             <a:fld id="{AB8F2B66-EF3A-FA46-9CD3-7791A59D726C}" type="datetimeFigureOut">
               <a:rPr lang="en-US" smtClean="0"/>
-              <a:t>1/16/2018</a:t>
+              <a:t>1/22/18</a:t>
             </a:fld>
             <a:endParaRPr lang="en-US" dirty="0"/>
           </a:p>
@@ -580,7 +580,7 @@
           <a:p>
             <a:fld id="{AB8F2B66-EF3A-FA46-9CD3-7791A59D726C}" type="datetimeFigureOut">
               <a:rPr lang="en-US" smtClean="0"/>
-              <a:t>1/16/2018</a:t>
+              <a:t>1/22/18</a:t>
             </a:fld>
             <a:endParaRPr lang="en-US" dirty="0"/>
           </a:p>
@@ -750,7 +750,7 @@
           <a:p>
             <a:fld id="{AB8F2B66-EF3A-FA46-9CD3-7791A59D726C}" type="datetimeFigureOut">
               <a:rPr lang="en-US" smtClean="0"/>
-              <a:t>1/16/2018</a:t>
+              <a:t>1/22/18</a:t>
             </a:fld>
             <a:endParaRPr lang="en-US" dirty="0"/>
           </a:p>
@@ -930,7 +930,7 @@
           <a:p>
             <a:fld id="{AB8F2B66-EF3A-FA46-9CD3-7791A59D726C}" type="datetimeFigureOut">
               <a:rPr lang="en-US" smtClean="0"/>
-              <a:t>1/16/2018</a:t>
+              <a:t>1/22/18</a:t>
             </a:fld>
             <a:endParaRPr lang="en-US" dirty="0"/>
           </a:p>
@@ -1101,7 +1101,7 @@
           <a:p>
             <a:fld id="{AB8F2B66-EF3A-FA46-9CD3-7791A59D726C}" type="datetimeFigureOut">
               <a:rPr lang="en-US" smtClean="0"/>
-              <a:t>1/16/2018</a:t>
+              <a:t>1/22/18</a:t>
             </a:fld>
             <a:endParaRPr lang="en-US" dirty="0"/>
           </a:p>
@@ -1304,7 +1304,7 @@
           <a:p>
             <a:fld id="{AB8F2B66-EF3A-FA46-9CD3-7791A59D726C}" type="datetimeFigureOut">
               <a:rPr lang="en-US" smtClean="0"/>
-              <a:t>1/16/2018</a:t>
+              <a:t>1/22/18</a:t>
             </a:fld>
             <a:endParaRPr lang="en-US" dirty="0"/>
           </a:p>
@@ -1612,7 +1612,7 @@
           <a:p>
             <a:fld id="{AB8F2B66-EF3A-FA46-9CD3-7791A59D726C}" type="datetimeFigureOut">
               <a:rPr lang="en-US" smtClean="0"/>
-              <a:t>1/16/2018</a:t>
+              <a:t>1/22/18</a:t>
             </a:fld>
             <a:endParaRPr lang="en-US" dirty="0"/>
           </a:p>
@@ -1900,7 +1900,7 @@
           <a:p>
             <a:fld id="{AB8F2B66-EF3A-FA46-9CD3-7791A59D726C}" type="datetimeFigureOut">
               <a:rPr lang="en-US" smtClean="0"/>
-              <a:t>1/16/2018</a:t>
+              <a:t>1/22/18</a:t>
             </a:fld>
             <a:endParaRPr lang="en-US" dirty="0"/>
           </a:p>
@@ -2322,7 +2322,7 @@
           <a:p>
             <a:fld id="{AB8F2B66-EF3A-FA46-9CD3-7791A59D726C}" type="datetimeFigureOut">
               <a:rPr lang="en-US" smtClean="0"/>
-              <a:t>1/16/2018</a:t>
+              <a:t>1/22/18</a:t>
             </a:fld>
             <a:endParaRPr lang="en-US" dirty="0"/>
           </a:p>
@@ -2440,7 +2440,7 @@
           <a:p>
             <a:fld id="{AB8F2B66-EF3A-FA46-9CD3-7791A59D726C}" type="datetimeFigureOut">
               <a:rPr lang="en-US" smtClean="0"/>
-              <a:t>1/16/2018</a:t>
+              <a:t>1/22/18</a:t>
             </a:fld>
             <a:endParaRPr lang="en-US" dirty="0"/>
           </a:p>
@@ -2535,7 +2535,7 @@
           <a:p>
             <a:fld id="{AB8F2B66-EF3A-FA46-9CD3-7791A59D726C}" type="datetimeFigureOut">
               <a:rPr lang="en-US" smtClean="0"/>
-              <a:t>1/16/2018</a:t>
+              <a:t>1/22/18</a:t>
             </a:fld>
             <a:endParaRPr lang="en-US" dirty="0"/>
           </a:p>
@@ -2812,7 +2812,7 @@
           <a:p>
             <a:fld id="{AB8F2B66-EF3A-FA46-9CD3-7791A59D726C}" type="datetimeFigureOut">
               <a:rPr lang="en-US" smtClean="0"/>
-              <a:t>1/16/2018</a:t>
+              <a:t>1/22/18</a:t>
             </a:fld>
             <a:endParaRPr lang="en-US" dirty="0"/>
           </a:p>
@@ -3025,7 +3025,7 @@
           <a:p>
             <a:fld id="{AB8F2B66-EF3A-FA46-9CD3-7791A59D726C}" type="datetimeFigureOut">
               <a:rPr lang="en-US" smtClean="0"/>
-              <a:t>1/16/2018</a:t>
+              <a:t>1/22/18</a:t>
             </a:fld>
             <a:endParaRPr lang="en-US" dirty="0"/>
           </a:p>

</xml_diff>